<commit_message>
admin server and spring cloud
</commit_message>
<xml_diff>
--- a/doc/架构图.pptx
+++ b/doc/架构图.pptx
@@ -12,6 +12,7 @@
     <p:sldId id="260" r:id="rId6"/>
     <p:sldId id="261" r:id="rId7"/>
     <p:sldId id="262" r:id="rId8"/>
+    <p:sldId id="263" r:id="rId9"/>
   </p:sldIdLst>
   <p:sldSz cx="9144000" cy="6858000" type="screen4x3"/>
   <p:notesSz cx="6858000" cy="9144000"/>
@@ -295,7 +296,7 @@
             <a:fld id="{9CCB53D5-3F0A-4974-9E71-2401F19FA0D5}" type="datetimeFigureOut">
               <a:rPr lang="zh-CN" altLang="en-US" smtClean="0"/>
               <a:pPr/>
-              <a:t>2019/1/24</a:t>
+              <a:t>2019/2/26</a:t>
             </a:fld>
             <a:endParaRPr lang="zh-CN" altLang="en-US"/>
           </a:p>
@@ -462,7 +463,7 @@
             <a:fld id="{9CCB53D5-3F0A-4974-9E71-2401F19FA0D5}" type="datetimeFigureOut">
               <a:rPr lang="zh-CN" altLang="en-US" smtClean="0"/>
               <a:pPr/>
-              <a:t>2019/1/24</a:t>
+              <a:t>2019/2/26</a:t>
             </a:fld>
             <a:endParaRPr lang="zh-CN" altLang="en-US"/>
           </a:p>
@@ -639,7 +640,7 @@
             <a:fld id="{9CCB53D5-3F0A-4974-9E71-2401F19FA0D5}" type="datetimeFigureOut">
               <a:rPr lang="zh-CN" altLang="en-US" smtClean="0"/>
               <a:pPr/>
-              <a:t>2019/1/24</a:t>
+              <a:t>2019/2/26</a:t>
             </a:fld>
             <a:endParaRPr lang="zh-CN" altLang="en-US"/>
           </a:p>
@@ -806,7 +807,7 @@
             <a:fld id="{9CCB53D5-3F0A-4974-9E71-2401F19FA0D5}" type="datetimeFigureOut">
               <a:rPr lang="zh-CN" altLang="en-US" smtClean="0"/>
               <a:pPr/>
-              <a:t>2019/1/24</a:t>
+              <a:t>2019/2/26</a:t>
             </a:fld>
             <a:endParaRPr lang="zh-CN" altLang="en-US"/>
           </a:p>
@@ -1049,7 +1050,7 @@
             <a:fld id="{9CCB53D5-3F0A-4974-9E71-2401F19FA0D5}" type="datetimeFigureOut">
               <a:rPr lang="zh-CN" altLang="en-US" smtClean="0"/>
               <a:pPr/>
-              <a:t>2019/1/24</a:t>
+              <a:t>2019/2/26</a:t>
             </a:fld>
             <a:endParaRPr lang="zh-CN" altLang="en-US"/>
           </a:p>
@@ -1334,7 +1335,7 @@
             <a:fld id="{9CCB53D5-3F0A-4974-9E71-2401F19FA0D5}" type="datetimeFigureOut">
               <a:rPr lang="zh-CN" altLang="en-US" smtClean="0"/>
               <a:pPr/>
-              <a:t>2019/1/24</a:t>
+              <a:t>2019/2/26</a:t>
             </a:fld>
             <a:endParaRPr lang="zh-CN" altLang="en-US"/>
           </a:p>
@@ -1753,7 +1754,7 @@
             <a:fld id="{9CCB53D5-3F0A-4974-9E71-2401F19FA0D5}" type="datetimeFigureOut">
               <a:rPr lang="zh-CN" altLang="en-US" smtClean="0"/>
               <a:pPr/>
-              <a:t>2019/1/24</a:t>
+              <a:t>2019/2/26</a:t>
             </a:fld>
             <a:endParaRPr lang="zh-CN" altLang="en-US"/>
           </a:p>
@@ -1868,7 +1869,7 @@
             <a:fld id="{9CCB53D5-3F0A-4974-9E71-2401F19FA0D5}" type="datetimeFigureOut">
               <a:rPr lang="zh-CN" altLang="en-US" smtClean="0"/>
               <a:pPr/>
-              <a:t>2019/1/24</a:t>
+              <a:t>2019/2/26</a:t>
             </a:fld>
             <a:endParaRPr lang="zh-CN" altLang="en-US"/>
           </a:p>
@@ -1960,7 +1961,7 @@
             <a:fld id="{9CCB53D5-3F0A-4974-9E71-2401F19FA0D5}" type="datetimeFigureOut">
               <a:rPr lang="zh-CN" altLang="en-US" smtClean="0"/>
               <a:pPr/>
-              <a:t>2019/1/24</a:t>
+              <a:t>2019/2/26</a:t>
             </a:fld>
             <a:endParaRPr lang="zh-CN" altLang="en-US"/>
           </a:p>
@@ -2234,7 +2235,7 @@
             <a:fld id="{9CCB53D5-3F0A-4974-9E71-2401F19FA0D5}" type="datetimeFigureOut">
               <a:rPr lang="zh-CN" altLang="en-US" smtClean="0"/>
               <a:pPr/>
-              <a:t>2019/1/24</a:t>
+              <a:t>2019/2/26</a:t>
             </a:fld>
             <a:endParaRPr lang="zh-CN" altLang="en-US"/>
           </a:p>
@@ -2484,7 +2485,7 @@
             <a:fld id="{9CCB53D5-3F0A-4974-9E71-2401F19FA0D5}" type="datetimeFigureOut">
               <a:rPr lang="zh-CN" altLang="en-US" smtClean="0"/>
               <a:pPr/>
-              <a:t>2019/1/24</a:t>
+              <a:t>2019/2/26</a:t>
             </a:fld>
             <a:endParaRPr lang="zh-CN" altLang="en-US"/>
           </a:p>
@@ -2694,7 +2695,7 @@
             <a:fld id="{9CCB53D5-3F0A-4974-9E71-2401F19FA0D5}" type="datetimeFigureOut">
               <a:rPr lang="zh-CN" altLang="en-US" smtClean="0"/>
               <a:pPr/>
-              <a:t>2019/1/24</a:t>
+              <a:t>2019/2/26</a:t>
             </a:fld>
             <a:endParaRPr lang="zh-CN" altLang="en-US"/>
           </a:p>
@@ -4820,6 +4821,45 @@
           <a:chExt cx="0" cy="0"/>
         </a:xfrm>
       </p:grpSpPr>
+      <p:cxnSp>
+        <p:nvCxnSpPr>
+          <p:cNvPr id="57" name="直接箭头连接符 56"/>
+          <p:cNvCxnSpPr>
+            <a:stCxn id="77" idx="1"/>
+            <a:endCxn id="35" idx="3"/>
+          </p:cNvCxnSpPr>
+          <p:nvPr/>
+        </p:nvCxnSpPr>
+        <p:spPr>
+          <a:xfrm flipH="1">
+            <a:off x="2987824" y="1808820"/>
+            <a:ext cx="1512168" cy="1613830"/>
+          </a:xfrm>
+          <a:prstGeom prst="straightConnector1">
+            <a:avLst/>
+          </a:prstGeom>
+          <a:ln>
+            <a:solidFill>
+              <a:srgbClr val="FF0000"/>
+            </a:solidFill>
+            <a:tailEnd type="arrow"/>
+          </a:ln>
+        </p:spPr>
+        <p:style>
+          <a:lnRef idx="1">
+            <a:schemeClr val="accent1"/>
+          </a:lnRef>
+          <a:fillRef idx="0">
+            <a:schemeClr val="accent1"/>
+          </a:fillRef>
+          <a:effectRef idx="0">
+            <a:schemeClr val="accent1"/>
+          </a:effectRef>
+          <a:fontRef idx="minor">
+            <a:schemeClr val="tx1"/>
+          </a:fontRef>
+        </p:style>
+      </p:cxnSp>
       <p:sp>
         <p:nvSpPr>
           <p:cNvPr id="35" name="矩形 34"/>
@@ -6265,53 +6305,6 @@
       </p:cxnSp>
       <p:sp>
         <p:nvSpPr>
-          <p:cNvPr id="64" name="矩形 63"/>
-          <p:cNvSpPr/>
-          <p:nvPr/>
-        </p:nvSpPr>
-        <p:spPr>
-          <a:xfrm>
-            <a:off x="4860032" y="116632"/>
-            <a:ext cx="1224136" cy="360040"/>
-          </a:xfrm>
-          <a:prstGeom prst="rect">
-            <a:avLst/>
-          </a:prstGeom>
-          <a:ln>
-            <a:noFill/>
-          </a:ln>
-        </p:spPr>
-        <p:style>
-          <a:lnRef idx="2">
-            <a:schemeClr val="accent1">
-              <a:shade val="50000"/>
-            </a:schemeClr>
-          </a:lnRef>
-          <a:fillRef idx="1">
-            <a:schemeClr val="accent1"/>
-          </a:fillRef>
-          <a:effectRef idx="0">
-            <a:schemeClr val="accent1"/>
-          </a:effectRef>
-          <a:fontRef idx="minor">
-            <a:schemeClr val="lt1"/>
-          </a:fontRef>
-        </p:style>
-        <p:txBody>
-          <a:bodyPr rtlCol="0" anchor="ctr"/>
-          <a:lstStyle/>
-          <a:p>
-            <a:pPr algn="ctr"/>
-            <a:r>
-              <a:rPr lang="zh-CN" altLang="en-US" sz="1200" dirty="0" smtClean="0"/>
-              <a:t>客户端</a:t>
-            </a:r>
-            <a:endParaRPr lang="zh-CN" altLang="en-US" sz="1200" dirty="0"/>
-          </a:p>
-        </p:txBody>
-      </p:sp>
-      <p:sp>
-        <p:nvSpPr>
           <p:cNvPr id="65" name="矩形 64"/>
           <p:cNvSpPr/>
           <p:nvPr/>
@@ -6369,15 +6362,15 @@
         <p:nvCxnSpPr>
           <p:cNvPr id="68" name="直接箭头连接符 67"/>
           <p:cNvCxnSpPr>
-            <a:stCxn id="64" idx="2"/>
+            <a:stCxn id="51" idx="4"/>
             <a:endCxn id="65" idx="0"/>
           </p:cNvCxnSpPr>
           <p:nvPr/>
         </p:nvCxnSpPr>
         <p:spPr>
           <a:xfrm>
-            <a:off x="5472100" y="476672"/>
-            <a:ext cx="0" cy="216024"/>
+            <a:off x="5472100" y="495468"/>
+            <a:ext cx="0" cy="197228"/>
           </a:xfrm>
           <a:prstGeom prst="straightConnector1">
             <a:avLst/>
@@ -6822,7 +6815,7 @@
         </p:nvSpPr>
         <p:spPr>
           <a:xfrm>
-            <a:off x="2123728" y="5877272"/>
+            <a:off x="2123728" y="5949280"/>
             <a:ext cx="648072" cy="576064"/>
           </a:xfrm>
           <a:prstGeom prst="flowChartMagneticDisk">
@@ -6871,7 +6864,7 @@
         <p:spPr>
           <a:xfrm>
             <a:off x="2447764" y="5733256"/>
-            <a:ext cx="0" cy="144016"/>
+            <a:ext cx="0" cy="216024"/>
           </a:xfrm>
           <a:prstGeom prst="straightConnector1">
             <a:avLst/>
@@ -7016,47 +7009,6 @@
           </a:fontRef>
         </p:style>
       </p:cxnSp>
-      <p:cxnSp>
-        <p:nvCxnSpPr>
-          <p:cNvPr id="142" name="肘形连接符 141"/>
-          <p:cNvCxnSpPr>
-            <a:stCxn id="41" idx="1"/>
-            <a:endCxn id="79" idx="3"/>
-          </p:cNvCxnSpPr>
-          <p:nvPr/>
-        </p:nvCxnSpPr>
-        <p:spPr>
-          <a:xfrm rot="10800000">
-            <a:off x="3563888" y="1808820"/>
-            <a:ext cx="1296144" cy="1613830"/>
-          </a:xfrm>
-          <a:prstGeom prst="bentConnector3">
-            <a:avLst>
-              <a:gd name="adj1" fmla="val 50000"/>
-            </a:avLst>
-          </a:prstGeom>
-          <a:ln>
-            <a:solidFill>
-              <a:srgbClr val="00B050"/>
-            </a:solidFill>
-            <a:tailEnd type="arrow"/>
-          </a:ln>
-        </p:spPr>
-        <p:style>
-          <a:lnRef idx="1">
-            <a:schemeClr val="accent1"/>
-          </a:lnRef>
-          <a:fillRef idx="0">
-            <a:schemeClr val="accent1"/>
-          </a:fillRef>
-          <a:effectRef idx="0">
-            <a:schemeClr val="accent1"/>
-          </a:effectRef>
-          <a:fontRef idx="minor">
-            <a:schemeClr val="tx1"/>
-          </a:fontRef>
-        </p:style>
-      </p:cxnSp>
       <p:sp>
         <p:nvSpPr>
           <p:cNvPr id="151" name="矩形 150"/>
@@ -7145,79 +7097,19 @@
           </a:fontRef>
         </p:style>
       </p:cxnSp>
-      <p:sp>
-        <p:nvSpPr>
-          <p:cNvPr id="156" name="矩形 155"/>
-          <p:cNvSpPr/>
-          <p:nvPr/>
-        </p:nvSpPr>
-        <p:spPr>
-          <a:xfrm>
-            <a:off x="3779912" y="5733256"/>
-            <a:ext cx="1080120" cy="504056"/>
-          </a:xfrm>
-          <a:prstGeom prst="rect">
-            <a:avLst/>
-          </a:prstGeom>
-          <a:solidFill>
-            <a:schemeClr val="accent3">
-              <a:lumMod val="50000"/>
-            </a:schemeClr>
-          </a:solidFill>
-          <a:ln>
-            <a:noFill/>
-          </a:ln>
-        </p:spPr>
-        <p:style>
-          <a:lnRef idx="2">
-            <a:schemeClr val="accent1">
-              <a:shade val="50000"/>
-            </a:schemeClr>
-          </a:lnRef>
-          <a:fillRef idx="1">
-            <a:schemeClr val="accent1"/>
-          </a:fillRef>
-          <a:effectRef idx="0">
-            <a:schemeClr val="accent1"/>
-          </a:effectRef>
-          <a:fontRef idx="minor">
-            <a:schemeClr val="lt1"/>
-          </a:fontRef>
-        </p:style>
-        <p:txBody>
-          <a:bodyPr rtlCol="0" anchor="ctr"/>
-          <a:lstStyle/>
-          <a:p>
-            <a:pPr algn="ctr"/>
-            <a:r>
-              <a:rPr lang="en-US" altLang="zh-CN" sz="1200" dirty="0" err="1" smtClean="0">
-                <a:solidFill>
-                  <a:schemeClr val="bg1"/>
-                </a:solidFill>
-              </a:rPr>
-              <a:t>RabbitMQ</a:t>
-            </a:r>
-            <a:endParaRPr lang="zh-CN" altLang="en-US" sz="1200" dirty="0">
-              <a:solidFill>
-                <a:schemeClr val="bg1"/>
-              </a:solidFill>
-            </a:endParaRPr>
-          </a:p>
-        </p:txBody>
-      </p:sp>
       <p:cxnSp>
         <p:nvCxnSpPr>
           <p:cNvPr id="158" name="肘形连接符 157"/>
           <p:cNvCxnSpPr>
             <a:stCxn id="36" idx="2"/>
-            <a:endCxn id="156" idx="0"/>
+            <a:endCxn id="70" idx="1"/>
           </p:cNvCxnSpPr>
           <p:nvPr/>
         </p:nvCxnSpPr>
         <p:spPr>
           <a:xfrm rot="16200000" flipH="1">
-            <a:off x="1760513" y="3173797"/>
-            <a:ext cx="1518518" cy="3600400"/>
+            <a:off x="1670503" y="3263807"/>
+            <a:ext cx="1734542" cy="3636404"/>
           </a:xfrm>
           <a:prstGeom prst="bentConnector3">
             <a:avLst>
@@ -7251,14 +7143,14 @@
           <p:cNvPr id="160" name="肘形连接符 159"/>
           <p:cNvCxnSpPr>
             <a:stCxn id="41" idx="2"/>
-            <a:endCxn id="156" idx="0"/>
+            <a:endCxn id="70" idx="1"/>
           </p:cNvCxnSpPr>
           <p:nvPr/>
         </p:nvCxnSpPr>
         <p:spPr>
           <a:xfrm rot="5400000">
-            <a:off x="4136777" y="4397933"/>
-            <a:ext cx="1518518" cy="1152128"/>
+            <a:off x="4046767" y="4523947"/>
+            <a:ext cx="1734542" cy="1116124"/>
           </a:xfrm>
           <a:prstGeom prst="bentConnector3">
             <a:avLst>
@@ -7287,6 +7179,352 @@
           </a:fontRef>
         </p:style>
       </p:cxnSp>
+      <p:sp>
+        <p:nvSpPr>
+          <p:cNvPr id="51" name="笑脸 50"/>
+          <p:cNvSpPr/>
+          <p:nvPr/>
+        </p:nvSpPr>
+        <p:spPr>
+          <a:xfrm>
+            <a:off x="5292080" y="162812"/>
+            <a:ext cx="360040" cy="332656"/>
+          </a:xfrm>
+          <a:prstGeom prst="smileyFace">
+            <a:avLst/>
+          </a:prstGeom>
+        </p:spPr>
+        <p:style>
+          <a:lnRef idx="2">
+            <a:schemeClr val="accent1">
+              <a:shade val="50000"/>
+            </a:schemeClr>
+          </a:lnRef>
+          <a:fillRef idx="1">
+            <a:schemeClr val="accent1"/>
+          </a:fillRef>
+          <a:effectRef idx="0">
+            <a:schemeClr val="accent1"/>
+          </a:effectRef>
+          <a:fontRef idx="minor">
+            <a:schemeClr val="lt1"/>
+          </a:fontRef>
+        </p:style>
+        <p:txBody>
+          <a:bodyPr rtlCol="0" anchor="ctr"/>
+          <a:lstStyle/>
+          <a:p>
+            <a:pPr algn="ctr"/>
+            <a:endParaRPr lang="zh-CN" altLang="en-US"/>
+          </a:p>
+        </p:txBody>
+      </p:sp>
+      <p:sp>
+        <p:nvSpPr>
+          <p:cNvPr id="61" name="矩形 60"/>
+          <p:cNvSpPr/>
+          <p:nvPr/>
+        </p:nvSpPr>
+        <p:spPr>
+          <a:xfrm>
+            <a:off x="6300192" y="5373216"/>
+            <a:ext cx="1224136" cy="432048"/>
+          </a:xfrm>
+          <a:prstGeom prst="rect">
+            <a:avLst/>
+          </a:prstGeom>
+          <a:solidFill>
+            <a:schemeClr val="accent6">
+              <a:lumMod val="75000"/>
+            </a:schemeClr>
+          </a:solidFill>
+          <a:ln>
+            <a:noFill/>
+          </a:ln>
+        </p:spPr>
+        <p:style>
+          <a:lnRef idx="2">
+            <a:schemeClr val="accent1">
+              <a:shade val="50000"/>
+            </a:schemeClr>
+          </a:lnRef>
+          <a:fillRef idx="1">
+            <a:schemeClr val="accent1"/>
+          </a:fillRef>
+          <a:effectRef idx="0">
+            <a:schemeClr val="accent1"/>
+          </a:effectRef>
+          <a:fontRef idx="minor">
+            <a:schemeClr val="lt1"/>
+          </a:fontRef>
+        </p:style>
+        <p:txBody>
+          <a:bodyPr rtlCol="0" anchor="ctr"/>
+          <a:lstStyle/>
+          <a:p>
+            <a:pPr algn="ctr"/>
+            <a:r>
+              <a:rPr lang="en-US" altLang="zh-CN" sz="1200" dirty="0" smtClean="0"/>
+              <a:t>ELK</a:t>
+            </a:r>
+            <a:endParaRPr lang="zh-CN" altLang="en-US" sz="1200" dirty="0"/>
+          </a:p>
+        </p:txBody>
+      </p:sp>
+      <p:sp>
+        <p:nvSpPr>
+          <p:cNvPr id="66" name="流程图: 磁盘 65"/>
+          <p:cNvSpPr/>
+          <p:nvPr/>
+        </p:nvSpPr>
+        <p:spPr>
+          <a:xfrm>
+            <a:off x="755576" y="5949280"/>
+            <a:ext cx="648072" cy="576064"/>
+          </a:xfrm>
+          <a:prstGeom prst="flowChartMagneticDisk">
+            <a:avLst/>
+          </a:prstGeom>
+          <a:ln w="3175"/>
+        </p:spPr>
+        <p:style>
+          <a:lnRef idx="2">
+            <a:schemeClr val="accent1">
+              <a:shade val="50000"/>
+            </a:schemeClr>
+          </a:lnRef>
+          <a:fillRef idx="1">
+            <a:schemeClr val="accent1"/>
+          </a:fillRef>
+          <a:effectRef idx="0">
+            <a:schemeClr val="accent1"/>
+          </a:effectRef>
+          <a:fontRef idx="minor">
+            <a:schemeClr val="lt1"/>
+          </a:fontRef>
+        </p:style>
+        <p:txBody>
+          <a:bodyPr rtlCol="0" anchor="ctr"/>
+          <a:lstStyle/>
+          <a:p>
+            <a:pPr algn="ctr"/>
+            <a:r>
+              <a:rPr lang="en-US" altLang="zh-CN" sz="1100" dirty="0" err="1" smtClean="0"/>
+              <a:t>Redis</a:t>
+            </a:r>
+            <a:endParaRPr lang="zh-CN" altLang="en-US" sz="1100" dirty="0"/>
+          </a:p>
+        </p:txBody>
+      </p:sp>
+      <p:sp>
+        <p:nvSpPr>
+          <p:cNvPr id="70" name="流程图: 磁盘 69"/>
+          <p:cNvSpPr/>
+          <p:nvPr/>
+        </p:nvSpPr>
+        <p:spPr>
+          <a:xfrm>
+            <a:off x="3923928" y="5949280"/>
+            <a:ext cx="864096" cy="576064"/>
+          </a:xfrm>
+          <a:prstGeom prst="flowChartMagneticDisk">
+            <a:avLst/>
+          </a:prstGeom>
+          <a:ln w="3175"/>
+        </p:spPr>
+        <p:style>
+          <a:lnRef idx="2">
+            <a:schemeClr val="accent1">
+              <a:shade val="50000"/>
+            </a:schemeClr>
+          </a:lnRef>
+          <a:fillRef idx="1">
+            <a:schemeClr val="accent1"/>
+          </a:fillRef>
+          <a:effectRef idx="0">
+            <a:schemeClr val="accent1"/>
+          </a:effectRef>
+          <a:fontRef idx="minor">
+            <a:schemeClr val="lt1"/>
+          </a:fontRef>
+        </p:style>
+        <p:txBody>
+          <a:bodyPr rtlCol="0" anchor="ctr"/>
+          <a:lstStyle/>
+          <a:p>
+            <a:pPr algn="ctr"/>
+            <a:r>
+              <a:rPr lang="en-US" altLang="zh-CN" sz="1100" dirty="0" err="1" smtClean="0">
+                <a:solidFill>
+                  <a:schemeClr val="bg1"/>
+                </a:solidFill>
+              </a:rPr>
+              <a:t>RabbitMQ</a:t>
+            </a:r>
+            <a:endParaRPr lang="zh-CN" altLang="en-US" sz="1100" dirty="0"/>
+          </a:p>
+        </p:txBody>
+      </p:sp>
+      <p:cxnSp>
+        <p:nvCxnSpPr>
+          <p:cNvPr id="75" name="直接箭头连接符 74"/>
+          <p:cNvCxnSpPr>
+            <a:stCxn id="41" idx="1"/>
+            <a:endCxn id="79" idx="3"/>
+          </p:cNvCxnSpPr>
+          <p:nvPr/>
+        </p:nvCxnSpPr>
+        <p:spPr>
+          <a:xfrm flipH="1" flipV="1">
+            <a:off x="3563888" y="1808820"/>
+            <a:ext cx="1296144" cy="1613830"/>
+          </a:xfrm>
+          <a:prstGeom prst="straightConnector1">
+            <a:avLst/>
+          </a:prstGeom>
+          <a:ln>
+            <a:solidFill>
+              <a:srgbClr val="00B050"/>
+            </a:solidFill>
+            <a:tailEnd type="arrow"/>
+          </a:ln>
+        </p:spPr>
+        <p:style>
+          <a:lnRef idx="1">
+            <a:schemeClr val="accent1"/>
+          </a:lnRef>
+          <a:fillRef idx="0">
+            <a:schemeClr val="accent1"/>
+          </a:fillRef>
+          <a:effectRef idx="0">
+            <a:schemeClr val="accent1"/>
+          </a:effectRef>
+          <a:fontRef idx="minor">
+            <a:schemeClr val="tx1"/>
+          </a:fontRef>
+        </p:style>
+      </p:cxnSp>
+      <p:sp>
+        <p:nvSpPr>
+          <p:cNvPr id="87" name="矩形 86"/>
+          <p:cNvSpPr/>
+          <p:nvPr/>
+        </p:nvSpPr>
+        <p:spPr>
+          <a:xfrm>
+            <a:off x="3563888" y="3645024"/>
+            <a:ext cx="792088" cy="432048"/>
+          </a:xfrm>
+          <a:prstGeom prst="rect">
+            <a:avLst/>
+          </a:prstGeom>
+          <a:solidFill>
+            <a:srgbClr val="FFC000"/>
+          </a:solidFill>
+          <a:ln>
+            <a:noFill/>
+          </a:ln>
+        </p:spPr>
+        <p:style>
+          <a:lnRef idx="2">
+            <a:schemeClr val="accent1">
+              <a:shade val="50000"/>
+            </a:schemeClr>
+          </a:lnRef>
+          <a:fillRef idx="1">
+            <a:schemeClr val="accent1"/>
+          </a:fillRef>
+          <a:effectRef idx="0">
+            <a:schemeClr val="accent1"/>
+          </a:effectRef>
+          <a:fontRef idx="minor">
+            <a:schemeClr val="lt1"/>
+          </a:fontRef>
+        </p:style>
+        <p:txBody>
+          <a:bodyPr rtlCol="0" anchor="ctr"/>
+          <a:lstStyle/>
+          <a:p>
+            <a:pPr algn="ctr"/>
+            <a:r>
+              <a:rPr lang="en-US" altLang="zh-CN" sz="1200" dirty="0" smtClean="0">
+                <a:solidFill>
+                  <a:schemeClr val="tx1"/>
+                </a:solidFill>
+              </a:rPr>
+              <a:t>Auth</a:t>
+            </a:r>
+          </a:p>
+          <a:p>
+            <a:pPr algn="ctr"/>
+            <a:r>
+              <a:rPr lang="en-US" altLang="zh-CN" sz="1200" dirty="0" smtClean="0">
+                <a:solidFill>
+                  <a:schemeClr val="tx1"/>
+                </a:solidFill>
+              </a:rPr>
+              <a:t>Service</a:t>
+            </a:r>
+            <a:endParaRPr lang="zh-CN" altLang="en-US" sz="1200" dirty="0">
+              <a:solidFill>
+                <a:schemeClr val="tx1"/>
+              </a:solidFill>
+            </a:endParaRPr>
+          </a:p>
+        </p:txBody>
+      </p:sp>
+      <p:sp>
+        <p:nvSpPr>
+          <p:cNvPr id="62" name="矩形 61"/>
+          <p:cNvSpPr/>
+          <p:nvPr/>
+        </p:nvSpPr>
+        <p:spPr>
+          <a:xfrm>
+            <a:off x="107504" y="5229200"/>
+            <a:ext cx="1224136" cy="504056"/>
+          </a:xfrm>
+          <a:prstGeom prst="rect">
+            <a:avLst/>
+          </a:prstGeom>
+          <a:solidFill>
+            <a:schemeClr val="accent3">
+              <a:lumMod val="50000"/>
+            </a:schemeClr>
+          </a:solidFill>
+          <a:ln>
+            <a:noFill/>
+          </a:ln>
+        </p:spPr>
+        <p:style>
+          <a:lnRef idx="2">
+            <a:schemeClr val="accent1">
+              <a:shade val="50000"/>
+            </a:schemeClr>
+          </a:lnRef>
+          <a:fillRef idx="1">
+            <a:schemeClr val="accent1"/>
+          </a:fillRef>
+          <a:effectRef idx="0">
+            <a:schemeClr val="accent1"/>
+          </a:effectRef>
+          <a:fontRef idx="minor">
+            <a:schemeClr val="lt1"/>
+          </a:fontRef>
+        </p:style>
+        <p:txBody>
+          <a:bodyPr rtlCol="0" anchor="ctr"/>
+          <a:lstStyle/>
+          <a:p>
+            <a:pPr algn="ctr"/>
+            <a:r>
+              <a:rPr lang="en-US" altLang="zh-CN" sz="1200" dirty="0" smtClean="0"/>
+              <a:t>Admin Server</a:t>
+            </a:r>
+            <a:endParaRPr lang="zh-CN" altLang="en-US" sz="1200" dirty="0"/>
+          </a:p>
+        </p:txBody>
+      </p:sp>
     </p:spTree>
   </p:cSld>
   <p:clrMapOvr>
@@ -9887,52 +10125,6 @@
       </p:sp>
       <p:sp>
         <p:nvSpPr>
-          <p:cNvPr id="41" name="左右箭头 40"/>
-          <p:cNvSpPr/>
-          <p:nvPr/>
-        </p:nvSpPr>
-        <p:spPr>
-          <a:xfrm>
-            <a:off x="2014776" y="1887410"/>
-            <a:ext cx="792088" cy="216024"/>
-          </a:xfrm>
-          <a:prstGeom prst="leftRightArrow">
-            <a:avLst/>
-          </a:prstGeom>
-          <a:solidFill>
-            <a:srgbClr val="FFC000"/>
-          </a:solidFill>
-          <a:ln>
-            <a:noFill/>
-          </a:ln>
-        </p:spPr>
-        <p:style>
-          <a:lnRef idx="2">
-            <a:schemeClr val="accent1">
-              <a:shade val="50000"/>
-            </a:schemeClr>
-          </a:lnRef>
-          <a:fillRef idx="1">
-            <a:schemeClr val="accent1"/>
-          </a:fillRef>
-          <a:effectRef idx="0">
-            <a:schemeClr val="accent1"/>
-          </a:effectRef>
-          <a:fontRef idx="minor">
-            <a:schemeClr val="lt1"/>
-          </a:fontRef>
-        </p:style>
-        <p:txBody>
-          <a:bodyPr rtlCol="0" anchor="ctr"/>
-          <a:lstStyle/>
-          <a:p>
-            <a:pPr algn="ctr"/>
-            <a:endParaRPr lang="zh-CN" altLang="en-US"/>
-          </a:p>
-        </p:txBody>
-      </p:sp>
-      <p:sp>
-        <p:nvSpPr>
           <p:cNvPr id="44" name="矩形 43"/>
           <p:cNvSpPr/>
           <p:nvPr/>
@@ -10085,17 +10277,115 @@
       </p:sp>
       <p:sp>
         <p:nvSpPr>
-          <p:cNvPr id="49" name="左右箭头 48"/>
+          <p:cNvPr id="50" name="TextBox 49"/>
+          <p:cNvSpPr txBox="1"/>
+          <p:nvPr/>
+        </p:nvSpPr>
+        <p:spPr>
+          <a:xfrm>
+            <a:off x="4040236" y="1700808"/>
+            <a:ext cx="609462" cy="553998"/>
+          </a:xfrm>
+          <a:prstGeom prst="rect">
+            <a:avLst/>
+          </a:prstGeom>
+          <a:noFill/>
+        </p:spPr>
+        <p:txBody>
+          <a:bodyPr wrap="none" rtlCol="0">
+            <a:spAutoFit/>
+          </a:bodyPr>
+          <a:lstStyle/>
+          <a:p>
+            <a:pPr algn="ctr"/>
+            <a:r>
+              <a:rPr lang="en-US" altLang="zh-CN" sz="1000" dirty="0" smtClean="0"/>
+              <a:t>input</a:t>
+            </a:r>
+          </a:p>
+          <a:p>
+            <a:pPr algn="ctr"/>
+            <a:endParaRPr lang="en-US" altLang="zh-CN" sz="1000" dirty="0" smtClean="0"/>
+          </a:p>
+          <a:p>
+            <a:pPr algn="ctr"/>
+            <a:r>
+              <a:rPr lang="en-US" altLang="zh-CN" sz="1000" dirty="0" smtClean="0"/>
+              <a:t>Channel</a:t>
+            </a:r>
+            <a:endParaRPr lang="zh-CN" altLang="en-US" sz="1000" dirty="0"/>
+          </a:p>
+        </p:txBody>
+      </p:sp>
+      <p:sp>
+        <p:nvSpPr>
+          <p:cNvPr id="51" name="TextBox 50"/>
+          <p:cNvSpPr txBox="1"/>
+          <p:nvPr/>
+        </p:nvSpPr>
+        <p:spPr>
+          <a:xfrm>
+            <a:off x="4709970" y="2420888"/>
+            <a:ext cx="1798890" cy="400110"/>
+          </a:xfrm>
+          <a:prstGeom prst="rect">
+            <a:avLst/>
+          </a:prstGeom>
+          <a:noFill/>
+        </p:spPr>
+        <p:txBody>
+          <a:bodyPr wrap="none" rtlCol="0">
+            <a:spAutoFit/>
+          </a:bodyPr>
+          <a:lstStyle/>
+          <a:p>
+            <a:r>
+              <a:rPr lang="zh-CN" altLang="en-US" sz="1000" dirty="0" smtClean="0"/>
+              <a:t>通过</a:t>
+            </a:r>
+            <a:r>
+              <a:rPr lang="en-US" altLang="zh-CN" sz="1000" dirty="0" smtClean="0"/>
+              <a:t>input</a:t>
+            </a:r>
+            <a:r>
+              <a:rPr lang="zh-CN" altLang="en-US" sz="1000" dirty="0" smtClean="0"/>
+              <a:t>通道</a:t>
+            </a:r>
+            <a:endParaRPr lang="en-US" altLang="zh-CN" sz="1000" dirty="0" smtClean="0"/>
+          </a:p>
+          <a:p>
+            <a:r>
+              <a:rPr lang="zh-CN" altLang="en-US" sz="1000" dirty="0" smtClean="0"/>
+              <a:t>从指定的</a:t>
+            </a:r>
+            <a:r>
+              <a:rPr lang="en-US" altLang="zh-CN" sz="1000" dirty="0" smtClean="0"/>
+              <a:t>destination</a:t>
+            </a:r>
+            <a:r>
+              <a:rPr lang="zh-CN" altLang="en-US" sz="1000" dirty="0" smtClean="0"/>
+              <a:t>获取消息</a:t>
+            </a:r>
+            <a:endParaRPr lang="zh-CN" altLang="en-US" sz="1000" dirty="0"/>
+          </a:p>
+        </p:txBody>
+      </p:sp>
+      <p:sp>
+        <p:nvSpPr>
+          <p:cNvPr id="52" name="右箭头 51"/>
           <p:cNvSpPr/>
           <p:nvPr/>
         </p:nvSpPr>
         <p:spPr>
           <a:xfrm>
-            <a:off x="3951636" y="1868938"/>
-            <a:ext cx="792088" cy="216024"/>
-          </a:xfrm>
-          <a:prstGeom prst="leftRightArrow">
-            <a:avLst/>
+            <a:off x="2007420" y="1826352"/>
+            <a:ext cx="852980" cy="332332"/>
+          </a:xfrm>
+          <a:prstGeom prst="rightArrow">
+            <a:avLst>
+              <a:gd name="adj1" fmla="val 30759"/>
+              <a:gd name="adj2" fmla="val 47221"/>
+            </a:avLst>
           </a:prstGeom>
           <a:solidFill>
             <a:srgbClr val="FFC000"/>
@@ -10131,14 +10421,488 @@
       </p:sp>
       <p:sp>
         <p:nvSpPr>
-          <p:cNvPr id="50" name="TextBox 49"/>
+          <p:cNvPr id="53" name="右箭头 52"/>
+          <p:cNvSpPr/>
+          <p:nvPr/>
+        </p:nvSpPr>
+        <p:spPr>
+          <a:xfrm>
+            <a:off x="3923928" y="1809760"/>
+            <a:ext cx="852980" cy="332332"/>
+          </a:xfrm>
+          <a:prstGeom prst="rightArrow">
+            <a:avLst>
+              <a:gd name="adj1" fmla="val 30759"/>
+              <a:gd name="adj2" fmla="val 47221"/>
+            </a:avLst>
+          </a:prstGeom>
+          <a:solidFill>
+            <a:srgbClr val="FFC000"/>
+          </a:solidFill>
+          <a:ln>
+            <a:noFill/>
+          </a:ln>
+        </p:spPr>
+        <p:style>
+          <a:lnRef idx="2">
+            <a:schemeClr val="accent1">
+              <a:shade val="50000"/>
+            </a:schemeClr>
+          </a:lnRef>
+          <a:fillRef idx="1">
+            <a:schemeClr val="accent1"/>
+          </a:fillRef>
+          <a:effectRef idx="0">
+            <a:schemeClr val="accent1"/>
+          </a:effectRef>
+          <a:fontRef idx="minor">
+            <a:schemeClr val="lt1"/>
+          </a:fontRef>
+        </p:style>
+        <p:txBody>
+          <a:bodyPr rtlCol="0" anchor="ctr"/>
+          <a:lstStyle/>
+          <a:p>
+            <a:pPr algn="ctr"/>
+            <a:endParaRPr lang="zh-CN" altLang="en-US"/>
+          </a:p>
+        </p:txBody>
+      </p:sp>
+    </p:spTree>
+  </p:cSld>
+  <p:clrMapOvr>
+    <a:masterClrMapping/>
+  </p:clrMapOvr>
+</p:sld>
+</file>
+
+<file path=ppt/slides/slide8.xml><?xml version="1.0" encoding="utf-8"?>
+<p:sld xmlns:a="http://schemas.openxmlformats.org/drawingml/2006/main" xmlns:r="http://schemas.openxmlformats.org/officeDocument/2006/relationships" xmlns:p="http://schemas.openxmlformats.org/presentationml/2006/main">
+  <p:cSld>
+    <p:spTree>
+      <p:nvGrpSpPr>
+        <p:cNvPr id="1" name=""/>
+        <p:cNvGrpSpPr/>
+        <p:nvPr/>
+      </p:nvGrpSpPr>
+      <p:grpSpPr>
+        <a:xfrm>
+          <a:off x="0" y="0"/>
+          <a:ext cx="0" cy="0"/>
+          <a:chOff x="0" y="0"/>
+          <a:chExt cx="0" cy="0"/>
+        </a:xfrm>
+      </p:grpSpPr>
+      <p:sp>
+        <p:nvSpPr>
+          <p:cNvPr id="12" name="矩形 11"/>
+          <p:cNvSpPr/>
+          <p:nvPr/>
+        </p:nvSpPr>
+        <p:spPr>
+          <a:xfrm>
+            <a:off x="3491880" y="1196752"/>
+            <a:ext cx="1296144" cy="576064"/>
+          </a:xfrm>
+          <a:prstGeom prst="rect">
+            <a:avLst/>
+          </a:prstGeom>
+          <a:solidFill>
+            <a:schemeClr val="tx2">
+              <a:lumMod val="60000"/>
+              <a:lumOff val="40000"/>
+            </a:schemeClr>
+          </a:solidFill>
+          <a:ln>
+            <a:noFill/>
+          </a:ln>
+        </p:spPr>
+        <p:style>
+          <a:lnRef idx="2">
+            <a:schemeClr val="accent1">
+              <a:shade val="50000"/>
+            </a:schemeClr>
+          </a:lnRef>
+          <a:fillRef idx="1">
+            <a:schemeClr val="accent1"/>
+          </a:fillRef>
+          <a:effectRef idx="0">
+            <a:schemeClr val="accent1"/>
+          </a:effectRef>
+          <a:fontRef idx="minor">
+            <a:schemeClr val="lt1"/>
+          </a:fontRef>
+        </p:style>
+        <p:txBody>
+          <a:bodyPr rtlCol="0" anchor="ctr"/>
+          <a:lstStyle/>
+          <a:p>
+            <a:pPr algn="ctr"/>
+            <a:r>
+              <a:rPr lang="en-US" altLang="zh-CN" sz="1200" dirty="0" smtClean="0">
+                <a:solidFill>
+                  <a:schemeClr val="tx1"/>
+                </a:solidFill>
+              </a:rPr>
+              <a:t>Eureka </a:t>
+            </a:r>
+            <a:r>
+              <a:rPr lang="en-US" altLang="zh-CN" sz="1200" dirty="0" smtClean="0">
+                <a:solidFill>
+                  <a:schemeClr val="tx1"/>
+                </a:solidFill>
+              </a:rPr>
+              <a:t>Server</a:t>
+            </a:r>
+          </a:p>
+          <a:p>
+            <a:pPr algn="ctr"/>
+            <a:r>
+              <a:rPr lang="zh-CN" altLang="en-US" sz="1200" dirty="0" smtClean="0">
+                <a:solidFill>
+                  <a:schemeClr val="tx1"/>
+                </a:solidFill>
+              </a:rPr>
+              <a:t>服</a:t>
+            </a:r>
+            <a:r>
+              <a:rPr lang="zh-CN" altLang="en-US" sz="1200" dirty="0" smtClean="0">
+                <a:solidFill>
+                  <a:schemeClr val="tx1"/>
+                </a:solidFill>
+              </a:rPr>
+              <a:t>务注册中心</a:t>
+            </a:r>
+            <a:endParaRPr lang="zh-CN" altLang="en-US" sz="1200" dirty="0">
+              <a:solidFill>
+                <a:schemeClr val="tx1"/>
+              </a:solidFill>
+            </a:endParaRPr>
+          </a:p>
+        </p:txBody>
+      </p:sp>
+      <p:sp>
+        <p:nvSpPr>
+          <p:cNvPr id="13" name="矩形 12"/>
+          <p:cNvSpPr/>
+          <p:nvPr/>
+        </p:nvSpPr>
+        <p:spPr>
+          <a:xfrm>
+            <a:off x="2051720" y="2564904"/>
+            <a:ext cx="1368152" cy="576064"/>
+          </a:xfrm>
+          <a:prstGeom prst="rect">
+            <a:avLst/>
+          </a:prstGeom>
+          <a:solidFill>
+            <a:schemeClr val="accent2">
+              <a:lumMod val="60000"/>
+              <a:lumOff val="40000"/>
+            </a:schemeClr>
+          </a:solidFill>
+          <a:ln>
+            <a:noFill/>
+          </a:ln>
+        </p:spPr>
+        <p:style>
+          <a:lnRef idx="2">
+            <a:schemeClr val="accent1">
+              <a:shade val="50000"/>
+            </a:schemeClr>
+          </a:lnRef>
+          <a:fillRef idx="1">
+            <a:schemeClr val="accent1"/>
+          </a:fillRef>
+          <a:effectRef idx="0">
+            <a:schemeClr val="accent1"/>
+          </a:effectRef>
+          <a:fontRef idx="minor">
+            <a:schemeClr val="lt1"/>
+          </a:fontRef>
+        </p:style>
+        <p:txBody>
+          <a:bodyPr rtlCol="0" anchor="ctr"/>
+          <a:lstStyle/>
+          <a:p>
+            <a:pPr algn="ctr"/>
+            <a:r>
+              <a:rPr lang="en-US" altLang="zh-CN" sz="1200" dirty="0" smtClean="0"/>
+              <a:t>Spring Cloud Application</a:t>
+            </a:r>
+            <a:endParaRPr lang="zh-CN" altLang="en-US" sz="1200" dirty="0"/>
+          </a:p>
+        </p:txBody>
+      </p:sp>
+      <p:sp>
+        <p:nvSpPr>
+          <p:cNvPr id="14" name="矩形 13"/>
+          <p:cNvSpPr/>
+          <p:nvPr/>
+        </p:nvSpPr>
+        <p:spPr>
+          <a:xfrm>
+            <a:off x="4572000" y="2492896"/>
+            <a:ext cx="1224136" cy="576064"/>
+          </a:xfrm>
+          <a:prstGeom prst="rect">
+            <a:avLst/>
+          </a:prstGeom>
+          <a:solidFill>
+            <a:srgbClr val="00B0F0"/>
+          </a:solidFill>
+          <a:ln>
+            <a:noFill/>
+          </a:ln>
+        </p:spPr>
+        <p:style>
+          <a:lnRef idx="2">
+            <a:schemeClr val="accent1">
+              <a:shade val="50000"/>
+            </a:schemeClr>
+          </a:lnRef>
+          <a:fillRef idx="1">
+            <a:schemeClr val="accent1"/>
+          </a:fillRef>
+          <a:effectRef idx="0">
+            <a:schemeClr val="accent1"/>
+          </a:effectRef>
+          <a:fontRef idx="minor">
+            <a:schemeClr val="lt1"/>
+          </a:fontRef>
+        </p:style>
+        <p:txBody>
+          <a:bodyPr rtlCol="0" anchor="ctr"/>
+          <a:lstStyle/>
+          <a:p>
+            <a:pPr algn="ctr"/>
+            <a:r>
+              <a:rPr lang="en-US" altLang="zh-CN" sz="1200" dirty="0" smtClean="0"/>
+              <a:t>Admin Server</a:t>
+            </a:r>
+            <a:endParaRPr lang="zh-CN" altLang="en-US" sz="1200" dirty="0"/>
+          </a:p>
+        </p:txBody>
+      </p:sp>
+      <p:cxnSp>
+        <p:nvCxnSpPr>
+          <p:cNvPr id="16" name="直接箭头连接符 15"/>
+          <p:cNvCxnSpPr>
+            <a:stCxn id="14" idx="1"/>
+            <a:endCxn id="12" idx="2"/>
+          </p:cNvCxnSpPr>
+          <p:nvPr/>
+        </p:nvCxnSpPr>
+        <p:spPr>
+          <a:xfrm flipH="1" flipV="1">
+            <a:off x="4139952" y="1772816"/>
+            <a:ext cx="432048" cy="1008112"/>
+          </a:xfrm>
+          <a:prstGeom prst="straightConnector1">
+            <a:avLst/>
+          </a:prstGeom>
+          <a:ln w="19050">
+            <a:solidFill>
+              <a:srgbClr val="00B0F0"/>
+            </a:solidFill>
+            <a:tailEnd type="arrow"/>
+          </a:ln>
+        </p:spPr>
+        <p:style>
+          <a:lnRef idx="1">
+            <a:schemeClr val="accent1"/>
+          </a:lnRef>
+          <a:fillRef idx="0">
+            <a:schemeClr val="accent1"/>
+          </a:fillRef>
+          <a:effectRef idx="0">
+            <a:schemeClr val="accent1"/>
+          </a:effectRef>
+          <a:fontRef idx="minor">
+            <a:schemeClr val="tx1"/>
+          </a:fontRef>
+        </p:style>
+      </p:cxnSp>
+      <p:cxnSp>
+        <p:nvCxnSpPr>
+          <p:cNvPr id="18" name="直接箭头连接符 17"/>
+          <p:cNvCxnSpPr>
+            <a:stCxn id="13" idx="0"/>
+            <a:endCxn id="12" idx="2"/>
+          </p:cNvCxnSpPr>
+          <p:nvPr/>
+        </p:nvCxnSpPr>
+        <p:spPr>
+          <a:xfrm flipV="1">
+            <a:off x="2735796" y="1772816"/>
+            <a:ext cx="1404156" cy="792088"/>
+          </a:xfrm>
+          <a:prstGeom prst="straightConnector1">
+            <a:avLst/>
+          </a:prstGeom>
+          <a:ln w="19050">
+            <a:solidFill>
+              <a:srgbClr val="00B0F0"/>
+            </a:solidFill>
+            <a:tailEnd type="arrow"/>
+          </a:ln>
+        </p:spPr>
+        <p:style>
+          <a:lnRef idx="1">
+            <a:schemeClr val="accent1"/>
+          </a:lnRef>
+          <a:fillRef idx="0">
+            <a:schemeClr val="accent1"/>
+          </a:fillRef>
+          <a:effectRef idx="0">
+            <a:schemeClr val="accent1"/>
+          </a:effectRef>
+          <a:fontRef idx="minor">
+            <a:schemeClr val="tx1"/>
+          </a:fontRef>
+        </p:style>
+      </p:cxnSp>
+      <p:sp>
+        <p:nvSpPr>
+          <p:cNvPr id="20" name="矩形 19"/>
+          <p:cNvSpPr/>
+          <p:nvPr/>
+        </p:nvSpPr>
+        <p:spPr>
+          <a:xfrm>
+            <a:off x="2051720" y="3573016"/>
+            <a:ext cx="1368152" cy="576064"/>
+          </a:xfrm>
+          <a:prstGeom prst="rect">
+            <a:avLst/>
+          </a:prstGeom>
+          <a:solidFill>
+            <a:schemeClr val="accent2">
+              <a:lumMod val="60000"/>
+              <a:lumOff val="40000"/>
+            </a:schemeClr>
+          </a:solidFill>
+          <a:ln>
+            <a:noFill/>
+          </a:ln>
+        </p:spPr>
+        <p:style>
+          <a:lnRef idx="2">
+            <a:schemeClr val="accent1">
+              <a:shade val="50000"/>
+            </a:schemeClr>
+          </a:lnRef>
+          <a:fillRef idx="1">
+            <a:schemeClr val="accent1"/>
+          </a:fillRef>
+          <a:effectRef idx="0">
+            <a:schemeClr val="accent1"/>
+          </a:effectRef>
+          <a:fontRef idx="minor">
+            <a:schemeClr val="lt1"/>
+          </a:fontRef>
+        </p:style>
+        <p:txBody>
+          <a:bodyPr rtlCol="0" anchor="ctr"/>
+          <a:lstStyle/>
+          <a:p>
+            <a:pPr algn="ctr"/>
+            <a:r>
+              <a:rPr lang="en-US" altLang="zh-CN" sz="1200" dirty="0" smtClean="0"/>
+              <a:t>Spring Boot Application</a:t>
+            </a:r>
+            <a:endParaRPr lang="zh-CN" altLang="en-US" sz="1200" dirty="0"/>
+          </a:p>
+        </p:txBody>
+      </p:sp>
+      <p:cxnSp>
+        <p:nvCxnSpPr>
+          <p:cNvPr id="22" name="直接箭头连接符 21"/>
+          <p:cNvCxnSpPr>
+            <a:stCxn id="13" idx="3"/>
+            <a:endCxn id="14" idx="1"/>
+          </p:cNvCxnSpPr>
+          <p:nvPr/>
+        </p:nvCxnSpPr>
+        <p:spPr>
+          <a:xfrm flipV="1">
+            <a:off x="3419872" y="2780928"/>
+            <a:ext cx="1152128" cy="72008"/>
+          </a:xfrm>
+          <a:prstGeom prst="straightConnector1">
+            <a:avLst/>
+          </a:prstGeom>
+          <a:ln w="19050">
+            <a:solidFill>
+              <a:srgbClr val="FF0000"/>
+            </a:solidFill>
+            <a:tailEnd type="arrow"/>
+          </a:ln>
+        </p:spPr>
+        <p:style>
+          <a:lnRef idx="1">
+            <a:schemeClr val="accent1"/>
+          </a:lnRef>
+          <a:fillRef idx="0">
+            <a:schemeClr val="accent1"/>
+          </a:fillRef>
+          <a:effectRef idx="0">
+            <a:schemeClr val="accent1"/>
+          </a:effectRef>
+          <a:fontRef idx="minor">
+            <a:schemeClr val="tx1"/>
+          </a:fontRef>
+        </p:style>
+      </p:cxnSp>
+      <p:cxnSp>
+        <p:nvCxnSpPr>
+          <p:cNvPr id="24" name="直接箭头连接符 23"/>
+          <p:cNvCxnSpPr>
+            <a:stCxn id="20" idx="3"/>
+            <a:endCxn id="14" idx="1"/>
+          </p:cNvCxnSpPr>
+          <p:nvPr/>
+        </p:nvCxnSpPr>
+        <p:spPr>
+          <a:xfrm flipV="1">
+            <a:off x="3419872" y="2780928"/>
+            <a:ext cx="1152128" cy="1080120"/>
+          </a:xfrm>
+          <a:prstGeom prst="straightConnector1">
+            <a:avLst/>
+          </a:prstGeom>
+          <a:ln w="19050">
+            <a:solidFill>
+              <a:srgbClr val="FF0000"/>
+            </a:solidFill>
+            <a:tailEnd type="arrow"/>
+          </a:ln>
+        </p:spPr>
+        <p:style>
+          <a:lnRef idx="1">
+            <a:schemeClr val="accent1"/>
+          </a:lnRef>
+          <a:fillRef idx="0">
+            <a:schemeClr val="accent1"/>
+          </a:fillRef>
+          <a:effectRef idx="0">
+            <a:schemeClr val="accent1"/>
+          </a:effectRef>
+          <a:fontRef idx="minor">
+            <a:schemeClr val="tx1"/>
+          </a:fontRef>
+        </p:style>
+      </p:cxnSp>
+      <p:sp>
+        <p:nvSpPr>
+          <p:cNvPr id="38" name="TextBox 37"/>
           <p:cNvSpPr txBox="1"/>
           <p:nvPr/>
         </p:nvSpPr>
         <p:spPr>
           <a:xfrm>
-            <a:off x="4040236" y="1700808"/>
-            <a:ext cx="609462" cy="553998"/>
+            <a:off x="3491880" y="2060848"/>
+            <a:ext cx="800219" cy="276999"/>
           </a:xfrm>
           <a:prstGeom prst="rect">
             <a:avLst/>
@@ -10151,36 +10915,28 @@
           </a:bodyPr>
           <a:lstStyle/>
           <a:p>
-            <a:pPr algn="ctr"/>
-            <a:r>
-              <a:rPr lang="en-US" altLang="zh-CN" sz="1000" dirty="0" smtClean="0"/>
-              <a:t>input</a:t>
-            </a:r>
-          </a:p>
-          <a:p>
-            <a:pPr algn="ctr"/>
-            <a:endParaRPr lang="en-US" altLang="zh-CN" sz="1000" dirty="0" smtClean="0"/>
-          </a:p>
-          <a:p>
-            <a:pPr algn="ctr"/>
-            <a:r>
-              <a:rPr lang="en-US" altLang="zh-CN" sz="1000" dirty="0" smtClean="0"/>
-              <a:t>Channel</a:t>
-            </a:r>
-            <a:endParaRPr lang="zh-CN" altLang="en-US" sz="1000" dirty="0"/>
-          </a:p>
-        </p:txBody>
-      </p:sp>
-      <p:sp>
-        <p:nvSpPr>
-          <p:cNvPr id="51" name="TextBox 50"/>
+            <a:r>
+              <a:rPr lang="zh-CN" altLang="en-US" sz="1200" dirty="0" smtClean="0"/>
+              <a:t>服</a:t>
+            </a:r>
+            <a:r>
+              <a:rPr lang="zh-CN" altLang="en-US" sz="1200" dirty="0" smtClean="0"/>
+              <a:t>务注册</a:t>
+            </a:r>
+            <a:endParaRPr lang="zh-CN" altLang="en-US" sz="1200" dirty="0"/>
+          </a:p>
+        </p:txBody>
+      </p:sp>
+      <p:sp>
+        <p:nvSpPr>
+          <p:cNvPr id="41" name="TextBox 40"/>
           <p:cNvSpPr txBox="1"/>
           <p:nvPr/>
         </p:nvSpPr>
         <p:spPr>
           <a:xfrm>
-            <a:off x="4709970" y="2420888"/>
-            <a:ext cx="1798890" cy="400110"/>
+            <a:off x="3563888" y="2852936"/>
+            <a:ext cx="800219" cy="276999"/>
           </a:xfrm>
           <a:prstGeom prst="rect">
             <a:avLst/>
@@ -10194,33 +10950,14 @@
           <a:lstStyle/>
           <a:p>
             <a:r>
-              <a:rPr lang="zh-CN" altLang="en-US" sz="1000" dirty="0" smtClean="0"/>
-              <a:t>通过</a:t>
-            </a:r>
-            <a:r>
-              <a:rPr lang="en-US" altLang="zh-CN" sz="1000" dirty="0" smtClean="0"/>
-              <a:t>input</a:t>
-            </a:r>
-            <a:r>
-              <a:rPr lang="zh-CN" altLang="en-US" sz="1000" dirty="0" smtClean="0"/>
-              <a:t>通道</a:t>
-            </a:r>
-            <a:endParaRPr lang="en-US" altLang="zh-CN" sz="1000" dirty="0" smtClean="0"/>
-          </a:p>
-          <a:p>
-            <a:r>
-              <a:rPr lang="zh-CN" altLang="en-US" sz="1000" dirty="0" smtClean="0"/>
-              <a:t>从指定的</a:t>
-            </a:r>
-            <a:r>
-              <a:rPr lang="en-US" altLang="zh-CN" sz="1000" dirty="0" smtClean="0"/>
-              <a:t>destination</a:t>
-            </a:r>
-            <a:r>
-              <a:rPr lang="zh-CN" altLang="en-US" sz="1000" dirty="0" smtClean="0"/>
-              <a:t>获取消息</a:t>
-            </a:r>
-            <a:endParaRPr lang="zh-CN" altLang="en-US" sz="1000" dirty="0"/>
+              <a:rPr lang="zh-CN" altLang="en-US" sz="1200" dirty="0" smtClean="0"/>
+              <a:t>监控</a:t>
+            </a:r>
+            <a:r>
+              <a:rPr lang="zh-CN" altLang="en-US" sz="1200" dirty="0" smtClean="0"/>
+              <a:t>注册</a:t>
+            </a:r>
+            <a:endParaRPr lang="zh-CN" altLang="en-US" sz="1200" dirty="0"/>
           </a:p>
         </p:txBody>
       </p:sp>

</xml_diff>